<commit_message>
Slight change to Who? slide
</commit_message>
<xml_diff>
--- a/doc/slides/VStarBegins.pptx
+++ b/doc/slides/VStarBegins.pptx
@@ -197,7 +197,7 @@
             <a:fld id="{CCCFB0D0-E02B-4E40-A593-C48437288564}" type="datetimeFigureOut">
               <a:rPr lang="en-US" smtClean="0"/>
               <a:pPr/>
-              <a:t>8/16/09</a:t>
+              <a:t>8/17/09</a:t>
             </a:fld>
             <a:endParaRPr lang="en-US"/>
           </a:p>
@@ -657,7 +657,7 @@
             <a:fld id="{E73F8FE4-34DD-454E-8C0A-8D6C626BB0E4}" type="datetimeFigureOut">
               <a:rPr lang="en-US" smtClean="0"/>
               <a:pPr/>
-              <a:t>8/16/09</a:t>
+              <a:t>8/17/09</a:t>
             </a:fld>
             <a:endParaRPr lang="en-US"/>
           </a:p>
@@ -885,7 +885,7 @@
             <a:fld id="{E73F8FE4-34DD-454E-8C0A-8D6C626BB0E4}" type="datetimeFigureOut">
               <a:rPr lang="en-US" smtClean="0"/>
               <a:pPr/>
-              <a:t>8/16/09</a:t>
+              <a:t>8/17/09</a:t>
             </a:fld>
             <a:endParaRPr lang="en-US"/>
           </a:p>
@@ -1062,7 +1062,7 @@
             <a:fld id="{E73F8FE4-34DD-454E-8C0A-8D6C626BB0E4}" type="datetimeFigureOut">
               <a:rPr lang="en-US" smtClean="0"/>
               <a:pPr/>
-              <a:t>8/16/09</a:t>
+              <a:t>8/17/09</a:t>
             </a:fld>
             <a:endParaRPr lang="en-US"/>
           </a:p>
@@ -1229,7 +1229,7 @@
             <a:fld id="{E73F8FE4-34DD-454E-8C0A-8D6C626BB0E4}" type="datetimeFigureOut">
               <a:rPr lang="en-US" smtClean="0"/>
               <a:pPr/>
-              <a:t>8/16/09</a:t>
+              <a:t>8/17/09</a:t>
             </a:fld>
             <a:endParaRPr lang="en-US"/>
           </a:p>
@@ -1475,7 +1475,7 @@
             <a:fld id="{E73F8FE4-34DD-454E-8C0A-8D6C626BB0E4}" type="datetimeFigureOut">
               <a:rPr lang="en-US" smtClean="0"/>
               <a:pPr/>
-              <a:t>8/16/09</a:t>
+              <a:t>8/17/09</a:t>
             </a:fld>
             <a:endParaRPr lang="en-US"/>
           </a:p>
@@ -1741,7 +1741,7 @@
             <a:fld id="{E73F8FE4-34DD-454E-8C0A-8D6C626BB0E4}" type="datetimeFigureOut">
               <a:rPr lang="en-US" smtClean="0"/>
               <a:pPr/>
-              <a:t>8/16/09</a:t>
+              <a:t>8/17/09</a:t>
             </a:fld>
             <a:endParaRPr lang="en-US"/>
           </a:p>
@@ -2117,7 +2117,7 @@
             <a:fld id="{E73F8FE4-34DD-454E-8C0A-8D6C626BB0E4}" type="datetimeFigureOut">
               <a:rPr lang="en-US" smtClean="0"/>
               <a:pPr/>
-              <a:t>8/16/09</a:t>
+              <a:t>8/17/09</a:t>
             </a:fld>
             <a:endParaRPr lang="en-US"/>
           </a:p>
@@ -2232,7 +2232,7 @@
             <a:fld id="{E73F8FE4-34DD-454E-8C0A-8D6C626BB0E4}" type="datetimeFigureOut">
               <a:rPr lang="en-US" smtClean="0"/>
               <a:pPr/>
-              <a:t>8/16/09</a:t>
+              <a:t>8/17/09</a:t>
             </a:fld>
             <a:endParaRPr lang="en-US"/>
           </a:p>
@@ -2324,7 +2324,7 @@
             <a:fld id="{E73F8FE4-34DD-454E-8C0A-8D6C626BB0E4}" type="datetimeFigureOut">
               <a:rPr lang="en-US" smtClean="0"/>
               <a:pPr/>
-              <a:t>8/16/09</a:t>
+              <a:t>8/17/09</a:t>
             </a:fld>
             <a:endParaRPr lang="en-US"/>
           </a:p>
@@ -2584,7 +2584,7 @@
             <a:fld id="{E73F8FE4-34DD-454E-8C0A-8D6C626BB0E4}" type="datetimeFigureOut">
               <a:rPr lang="en-US" smtClean="0"/>
               <a:pPr/>
-              <a:t>8/16/09</a:t>
+              <a:t>8/17/09</a:t>
             </a:fld>
             <a:endParaRPr lang="en-US"/>
           </a:p>
@@ -2850,7 +2850,7 @@
             <a:fld id="{E73F8FE4-34DD-454E-8C0A-8D6C626BB0E4}" type="datetimeFigureOut">
               <a:rPr lang="en-US" smtClean="0"/>
               <a:pPr/>
-              <a:t>8/16/09</a:t>
+              <a:t>8/17/09</a:t>
             </a:fld>
             <a:endParaRPr lang="en-US"/>
           </a:p>
@@ -3069,7 +3069,7 @@
             <a:fld id="{E73F8FE4-34DD-454E-8C0A-8D6C626BB0E4}" type="datetimeFigureOut">
               <a:rPr lang="en-US" smtClean="0"/>
               <a:pPr/>
-              <a:t>8/16/09</a:t>
+              <a:t>8/17/09</a:t>
             </a:fld>
             <a:endParaRPr lang="en-US"/>
           </a:p>
@@ -3634,7 +3634,6 @@
               <a:rPr lang="en-US" dirty="0" smtClean="0"/>
               <a:t>Benn</a:t>
             </a:r>
-            <a:endParaRPr lang="en-US" dirty="0" smtClean="0"/>
           </a:p>
         </p:txBody>
       </p:sp>
@@ -3735,7 +3734,6 @@
               <a:rPr lang="en-US" dirty="0" smtClean="0"/>
               <a:t>Michael</a:t>
             </a:r>
-            <a:endParaRPr lang="en-US" dirty="0" smtClean="0"/>
           </a:p>
           <a:p>
             <a:pPr algn="ctr"/>
@@ -3862,36 +3860,19 @@
               <a:rPr lang="en-US" dirty="0" smtClean="0"/>
               <a:t>in need of more testers (the more the merrier, especially with respect to platforms);</a:t>
             </a:r>
-            <a:endParaRPr lang="en-US" dirty="0" smtClean="0"/>
           </a:p>
           <a:p>
             <a:r>
               <a:rPr lang="en-US" dirty="0" smtClean="0"/>
-              <a:t>no formal releases </a:t>
+              <a:t>no formal releases yet, but </a:t>
+            </a:r>
+            <a:r>
+              <a:rPr lang="en-US" dirty="0" err="1" smtClean="0"/>
+              <a:t>downloadble</a:t>
             </a:r>
             <a:r>
               <a:rPr lang="en-US" dirty="0" smtClean="0"/>
-              <a:t>yet, but </a:t>
-            </a:r>
-            <a:r>
-              <a:rPr lang="en-US" dirty="0" err="1" smtClean="0"/>
-              <a:t>d</a:t>
-            </a:r>
-            <a:r>
-              <a:rPr lang="en-US" dirty="0" err="1" smtClean="0"/>
-              <a:t>ownloadble</a:t>
-            </a:r>
-            <a:r>
-              <a:rPr lang="en-US" dirty="0" smtClean="0"/>
-              <a:t> (</a:t>
-            </a:r>
-            <a:r>
-              <a:rPr lang="en-US" dirty="0" smtClean="0"/>
-              <a:t>please </a:t>
-            </a:r>
-            <a:r>
-              <a:rPr lang="en-US" dirty="0" smtClean="0"/>
-              <a:t>do; see Links slide).</a:t>
+              <a:t> (please do; see Links slide).</a:t>
             </a:r>
           </a:p>
           <a:p>
@@ -3982,55 +3963,26 @@
               <a:rPr lang="en-US" dirty="0" smtClean="0"/>
               <a:t>Takes input from files and AAVSO database</a:t>
             </a:r>
-            <a:endParaRPr lang="en-US" dirty="0" smtClean="0"/>
           </a:p>
           <a:p>
             <a:pPr lvl="1"/>
             <a:r>
               <a:rPr lang="en-US" dirty="0" smtClean="0"/>
-              <a:t>Light curve with</a:t>
-            </a:r>
+              <a:t>Light curve with optional error bars</a:t>
+            </a:r>
+          </a:p>
+          <a:p>
+            <a:pPr lvl="1"/>
             <a:r>
               <a:rPr lang="en-US" dirty="0" smtClean="0"/>
-              <a:t> optional error </a:t>
-            </a:r>
+              <a:t>Mean plot plus light curve with optional error bars</a:t>
+            </a:r>
+          </a:p>
+          <a:p>
+            <a:pPr lvl="1"/>
             <a:r>
               <a:rPr lang="en-US" dirty="0" smtClean="0"/>
-              <a:t>bars</a:t>
-            </a:r>
-          </a:p>
-          <a:p>
-            <a:pPr lvl="1"/>
-            <a:r>
-              <a:rPr lang="en-US" dirty="0" smtClean="0"/>
-              <a:t>Mean </a:t>
-            </a:r>
-            <a:r>
-              <a:rPr lang="en-US" dirty="0" smtClean="0"/>
-              <a:t>plot plus light curve with</a:t>
-            </a:r>
-            <a:r>
-              <a:rPr lang="en-US" dirty="0" smtClean="0"/>
-              <a:t> optional error </a:t>
-            </a:r>
-            <a:r>
-              <a:rPr lang="en-US" dirty="0" smtClean="0"/>
-              <a:t>bars</a:t>
-            </a:r>
-          </a:p>
-          <a:p>
-            <a:pPr lvl="1"/>
-            <a:r>
-              <a:rPr lang="en-US" dirty="0" smtClean="0"/>
-              <a:t>Data related to each of these </a:t>
-            </a:r>
-            <a:r>
-              <a:rPr lang="en-US" dirty="0" smtClean="0"/>
-              <a:t>plots </a:t>
-            </a:r>
-            <a:r>
-              <a:rPr lang="en-US" dirty="0" smtClean="0"/>
-              <a:t>in tables</a:t>
+              <a:t>Data related to each of these plots in tables</a:t>
             </a:r>
           </a:p>
           <a:p>
@@ -4051,11 +4003,7 @@
             <a:pPr lvl="1"/>
             <a:r>
               <a:rPr lang="en-US" dirty="0" smtClean="0"/>
-              <a:t>Saving &amp; </a:t>
-            </a:r>
-            <a:r>
-              <a:rPr lang="en-US" dirty="0" smtClean="0"/>
-              <a:t>printing</a:t>
+              <a:t>Saving &amp; printing</a:t>
             </a:r>
           </a:p>
           <a:p>
@@ -4072,49 +4020,21 @@
             <a:pPr lvl="1"/>
             <a:r>
               <a:rPr lang="en-US" dirty="0" smtClean="0"/>
-              <a:t>Phase </a:t>
-            </a:r>
+              <a:t>Phase plots</a:t>
+            </a:r>
+          </a:p>
+          <a:p>
+            <a:pPr lvl="1"/>
             <a:r>
               <a:rPr lang="en-US" dirty="0" smtClean="0"/>
-              <a:t>plots</a:t>
+              <a:t>Period analysis algorithm implementation</a:t>
             </a:r>
           </a:p>
           <a:p>
             <a:pPr lvl="1"/>
             <a:r>
               <a:rPr lang="en-US" dirty="0" smtClean="0"/>
-              <a:t>Period analysis algorithm </a:t>
-            </a:r>
-            <a:r>
-              <a:rPr lang="en-US" dirty="0" smtClean="0"/>
-              <a:t>implementation</a:t>
-            </a:r>
-          </a:p>
-          <a:p>
-            <a:pPr lvl="1"/>
-            <a:r>
-              <a:rPr lang="en-US" dirty="0" smtClean="0"/>
-              <a:t>Bug </a:t>
-            </a:r>
-            <a:r>
-              <a:rPr lang="en-US" dirty="0" smtClean="0"/>
-              <a:t>fixes</a:t>
-            </a:r>
-            <a:r>
-              <a:rPr lang="en-US" dirty="0" smtClean="0"/>
-              <a:t> based </a:t>
-            </a:r>
-            <a:r>
-              <a:rPr lang="en-US" dirty="0" smtClean="0"/>
-              <a:t>upon feedback so </a:t>
-            </a:r>
-            <a:r>
-              <a:rPr lang="en-US" dirty="0" smtClean="0"/>
-              <a:t>far</a:t>
-            </a:r>
-            <a:r>
-              <a:rPr lang="en-US" dirty="0" smtClean="0"/>
-              <a:t> </a:t>
+              <a:t>Bug fixes based upon feedback so far </a:t>
             </a:r>
             <a:endParaRPr lang="en-US" dirty="0"/>
           </a:p>
@@ -4230,11 +4150,7 @@
             <a:pPr lvl="1"/>
             <a:r>
               <a:rPr lang="en-US" dirty="0" smtClean="0"/>
-              <a:t>Sara Beck, </a:t>
-            </a:r>
-            <a:r>
-              <a:rPr lang="en-US" dirty="0" smtClean="0"/>
-              <a:t>Arne </a:t>
+              <a:t>Sara Beck, Arne </a:t>
             </a:r>
             <a:r>
               <a:rPr lang="en-US" dirty="0" err="1" smtClean="0"/>
@@ -4250,26 +4166,14 @@
             </a:r>
             <a:r>
               <a:rPr lang="en-US" dirty="0" smtClean="0"/>
-              <a:t>, Aaron </a:t>
-            </a:r>
+              <a:t>, Aaron Price, Rebecca Turner, Matt Templeton</a:t>
+            </a:r>
+          </a:p>
+          <a:p>
+            <a:pPr lvl="2"/>
             <a:r>
               <a:rPr lang="en-US" dirty="0" smtClean="0"/>
-              <a:t>Price, Rebecca </a:t>
-            </a:r>
-            <a:r>
-              <a:rPr lang="en-US" dirty="0" smtClean="0"/>
-              <a:t>Turner, Matt Templeton</a:t>
-            </a:r>
-          </a:p>
-          <a:p>
-            <a:pPr lvl="2"/>
-            <a:r>
-              <a:rPr lang="en-US" dirty="0" smtClean="0"/>
-              <a:t>O</a:t>
-            </a:r>
-            <a:r>
-              <a:rPr lang="en-US" dirty="0" smtClean="0"/>
-              <a:t>versight, </a:t>
+              <a:t>Oversight, </a:t>
             </a:r>
             <a:r>
               <a:rPr lang="en-US" dirty="0" err="1" smtClean="0"/>
@@ -4282,22 +4186,13 @@
           </a:p>
           <a:p>
             <a:r>
-              <a:rPr lang="en-US" dirty="0" smtClean="0"/>
-              <a:t>You?</a:t>
-            </a:r>
-          </a:p>
-          <a:p>
-            <a:pPr lvl="1"/>
-            <a:r>
-              <a:rPr lang="en-US" dirty="0" smtClean="0"/>
-              <a:t>We need more testers</a:t>
-            </a:r>
-          </a:p>
-          <a:p>
-            <a:pPr>
-              <a:buNone/>
-            </a:pPr>
-            <a:endParaRPr lang="en-US" dirty="0"/>
+              <a:rPr lang="en-US" smtClean="0"/>
+              <a:t>You</a:t>
+            </a:r>
+            <a:r>
+              <a:rPr lang="en-US" smtClean="0"/>
+              <a:t>?</a:t>
+            </a:r>
           </a:p>
         </p:txBody>
       </p:sp>
@@ -4387,11 +4282,7 @@
             </a:r>
             <a:r>
               <a:rPr lang="en-US" dirty="0" smtClean="0"/>
-              <a:t> </a:t>
-            </a:r>
-            <a:r>
-              <a:rPr lang="en-US" dirty="0" smtClean="0"/>
-              <a:t>site</a:t>
+              <a:t> site</a:t>
             </a:r>
             <a:endParaRPr lang="en-US" dirty="0" smtClean="0">
               <a:hlinkClick r:id="rId2"/>
@@ -4403,19 +4294,7 @@
               <a:rPr lang="en-US" dirty="0" smtClean="0">
                 <a:hlinkClick r:id="rId2"/>
               </a:rPr>
-              <a:t>http</a:t>
-            </a:r>
-            <a:r>
-              <a:rPr lang="en-US" dirty="0" smtClean="0">
-                <a:hlinkClick r:id="rId2"/>
-              </a:rPr>
-              <a:t>://sourceforge.net/projects/vstar</a:t>
-            </a:r>
-            <a:r>
-              <a:rPr lang="en-US" dirty="0" smtClean="0">
-                <a:hlinkClick r:id="rId2"/>
-              </a:rPr>
-              <a:t>/</a:t>
+              <a:t>http://sourceforge.net/projects/vstar/</a:t>
             </a:r>
             <a:endParaRPr lang="en-US" dirty="0" smtClean="0"/>
           </a:p>
@@ -4450,13 +4329,7 @@
               <a:rPr lang="en-US" dirty="0" smtClean="0">
                 <a:hlinkClick r:id="rId3"/>
               </a:rPr>
-              <a:t>http://vstar.svn.sourceforge.net/viewvc/vstar/trunk</a:t>
-            </a:r>
-            <a:r>
-              <a:rPr lang="en-US" dirty="0" smtClean="0">
-                <a:hlinkClick r:id="rId3"/>
-              </a:rPr>
-              <a:t>/</a:t>
+              <a:t>http://vstar.svn.sourceforge.net/viewvc/vstar/trunk/</a:t>
             </a:r>
             <a:endParaRPr lang="en-US" dirty="0" smtClean="0"/>
           </a:p>
@@ -4516,9 +4389,6 @@
               </a:rPr>
               <a:t>svn co https://vstar.svn.sourceforge.net/svnroot/vstar/trunk vstar</a:t>
             </a:r>
-            <a:endParaRPr lang="en-US" dirty="0" smtClean="0">
-              <a:hlinkClick r:id="rId2"/>
-            </a:endParaRPr>
           </a:p>
           <a:p>
             <a:pPr>

</xml_diff>